<commit_message>
Modify existing scout cards in script
</commit_message>
<xml_diff>
--- a/default_templates.pptx
+++ b/default_templates.pptx
@@ -10,6 +10,8 @@
     <p:sldId id="273" r:id="rId4"/>
     <p:sldId id="275" r:id="rId5"/>
     <p:sldId id="276" r:id="rId6"/>
+    <p:sldId id="277" r:id="rId7"/>
+    <p:sldId id="278" r:id="rId8"/>
   </p:sldIdLst>
   <p:sldSz cx="9144000" cy="6858000" type="screen4x3"/>
   <p:notesSz cx="6858000" cy="9144000"/>
@@ -6658,6 +6660,896 @@
 </p:sld>
 </file>
 
+<file path=ppt/slides/slide6.xml><?xml version="1.0" encoding="utf-8"?>
+<p:sld xmlns:a="http://schemas.openxmlformats.org/drawingml/2006/main" xmlns:r="http://schemas.openxmlformats.org/officeDocument/2006/relationships" xmlns:p="http://schemas.openxmlformats.org/presentationml/2006/main">
+  <p:cSld>
+    <p:spTree>
+      <p:nvGrpSpPr>
+        <p:cNvPr id="1" name=""/>
+        <p:cNvGrpSpPr/>
+        <p:nvPr/>
+      </p:nvGrpSpPr>
+      <p:grpSpPr>
+        <a:xfrm>
+          <a:off x="0" y="0"/>
+          <a:ext cx="0" cy="0"/>
+          <a:chOff x="0" y="0"/>
+          <a:chExt cx="0" cy="0"/>
+        </a:xfrm>
+      </p:grpSpPr>
+      <p:cxnSp>
+        <p:nvCxnSpPr>
+          <p:cNvPr id="19" name="Straight Connector 18">
+            <a:extLst>
+              <a:ext uri="{FF2B5EF4-FFF2-40B4-BE49-F238E27FC236}">
+                <a16:creationId xmlns:a16="http://schemas.microsoft.com/office/drawing/2014/main" id="{B282C7A2-7DC7-42A3-9AFE-D71061BE32E9}"/>
+              </a:ext>
+            </a:extLst>
+          </p:cNvPr>
+          <p:cNvCxnSpPr/>
+          <p:nvPr/>
+        </p:nvCxnSpPr>
+        <p:spPr>
+          <a:xfrm>
+            <a:off x="1211913" y="3213717"/>
+            <a:ext cx="0" cy="3453413"/>
+          </a:xfrm>
+          <a:prstGeom prst="line">
+            <a:avLst/>
+          </a:prstGeom>
+        </p:spPr>
+        <p:style>
+          <a:lnRef idx="1">
+            <a:schemeClr val="accent1"/>
+          </a:lnRef>
+          <a:fillRef idx="0">
+            <a:schemeClr val="accent1"/>
+          </a:fillRef>
+          <a:effectRef idx="0">
+            <a:schemeClr val="accent1"/>
+          </a:effectRef>
+          <a:fontRef idx="minor">
+            <a:schemeClr val="tx1"/>
+          </a:fontRef>
+        </p:style>
+      </p:cxnSp>
+      <p:cxnSp>
+        <p:nvCxnSpPr>
+          <p:cNvPr id="20" name="Straight Connector 19">
+            <a:extLst>
+              <a:ext uri="{FF2B5EF4-FFF2-40B4-BE49-F238E27FC236}">
+                <a16:creationId xmlns:a16="http://schemas.microsoft.com/office/drawing/2014/main" id="{61ED0C4A-86F6-4341-AE22-402DFB6BC384}"/>
+              </a:ext>
+            </a:extLst>
+          </p:cNvPr>
+          <p:cNvCxnSpPr/>
+          <p:nvPr/>
+        </p:nvCxnSpPr>
+        <p:spPr>
+          <a:xfrm>
+            <a:off x="7898919" y="3286956"/>
+            <a:ext cx="0" cy="3453413"/>
+          </a:xfrm>
+          <a:prstGeom prst="line">
+            <a:avLst/>
+          </a:prstGeom>
+        </p:spPr>
+        <p:style>
+          <a:lnRef idx="1">
+            <a:schemeClr val="accent1"/>
+          </a:lnRef>
+          <a:fillRef idx="0">
+            <a:schemeClr val="accent1"/>
+          </a:fillRef>
+          <a:effectRef idx="0">
+            <a:schemeClr val="accent1"/>
+          </a:effectRef>
+          <a:fontRef idx="minor">
+            <a:schemeClr val="tx1"/>
+          </a:fontRef>
+        </p:style>
+      </p:cxnSp>
+      <p:cxnSp>
+        <p:nvCxnSpPr>
+          <p:cNvPr id="21" name="Straight Connector 20">
+            <a:extLst>
+              <a:ext uri="{FF2B5EF4-FFF2-40B4-BE49-F238E27FC236}">
+                <a16:creationId xmlns:a16="http://schemas.microsoft.com/office/drawing/2014/main" id="{E9DA7100-971C-4E3E-9218-EB1ACA2E1978}"/>
+              </a:ext>
+            </a:extLst>
+          </p:cNvPr>
+          <p:cNvCxnSpPr>
+            <a:cxnSpLocks/>
+          </p:cNvCxnSpPr>
+          <p:nvPr/>
+        </p:nvCxnSpPr>
+        <p:spPr>
+          <a:xfrm flipH="1">
+            <a:off x="195310" y="5687608"/>
+            <a:ext cx="8637972" cy="0"/>
+          </a:xfrm>
+          <a:prstGeom prst="line">
+            <a:avLst/>
+          </a:prstGeom>
+        </p:spPr>
+        <p:style>
+          <a:lnRef idx="1">
+            <a:schemeClr val="accent1"/>
+          </a:lnRef>
+          <a:fillRef idx="0">
+            <a:schemeClr val="accent1"/>
+          </a:fillRef>
+          <a:effectRef idx="0">
+            <a:schemeClr val="accent1"/>
+          </a:effectRef>
+          <a:fontRef idx="minor">
+            <a:schemeClr val="tx1"/>
+          </a:fontRef>
+        </p:style>
+      </p:cxnSp>
+      <p:cxnSp>
+        <p:nvCxnSpPr>
+          <p:cNvPr id="31" name="Straight Connector 30">
+            <a:extLst>
+              <a:ext uri="{FF2B5EF4-FFF2-40B4-BE49-F238E27FC236}">
+                <a16:creationId xmlns:a16="http://schemas.microsoft.com/office/drawing/2014/main" id="{A066C30E-F07F-48CA-8E2B-4D07D520F8BD}"/>
+              </a:ext>
+            </a:extLst>
+          </p:cNvPr>
+          <p:cNvCxnSpPr/>
+          <p:nvPr/>
+        </p:nvCxnSpPr>
+        <p:spPr>
+          <a:xfrm>
+            <a:off x="2900816" y="3286956"/>
+            <a:ext cx="0" cy="3453413"/>
+          </a:xfrm>
+          <a:prstGeom prst="line">
+            <a:avLst/>
+          </a:prstGeom>
+        </p:spPr>
+        <p:style>
+          <a:lnRef idx="1">
+            <a:schemeClr val="accent1"/>
+          </a:lnRef>
+          <a:fillRef idx="0">
+            <a:schemeClr val="accent1"/>
+          </a:fillRef>
+          <a:effectRef idx="0">
+            <a:schemeClr val="accent1"/>
+          </a:effectRef>
+          <a:fontRef idx="minor">
+            <a:schemeClr val="tx1"/>
+          </a:fontRef>
+        </p:style>
+      </p:cxnSp>
+      <p:cxnSp>
+        <p:nvCxnSpPr>
+          <p:cNvPr id="32" name="Straight Connector 31">
+            <a:extLst>
+              <a:ext uri="{FF2B5EF4-FFF2-40B4-BE49-F238E27FC236}">
+                <a16:creationId xmlns:a16="http://schemas.microsoft.com/office/drawing/2014/main" id="{73C4DBE1-C8F6-4421-9AA2-6AF8DE721DA1}"/>
+              </a:ext>
+            </a:extLst>
+          </p:cNvPr>
+          <p:cNvCxnSpPr/>
+          <p:nvPr/>
+        </p:nvCxnSpPr>
+        <p:spPr>
+          <a:xfrm>
+            <a:off x="6205097" y="3286956"/>
+            <a:ext cx="0" cy="3453413"/>
+          </a:xfrm>
+          <a:prstGeom prst="line">
+            <a:avLst/>
+          </a:prstGeom>
+        </p:spPr>
+        <p:style>
+          <a:lnRef idx="1">
+            <a:schemeClr val="accent1"/>
+          </a:lnRef>
+          <a:fillRef idx="0">
+            <a:schemeClr val="accent1"/>
+          </a:fillRef>
+          <a:effectRef idx="0">
+            <a:schemeClr val="accent1"/>
+          </a:effectRef>
+          <a:fontRef idx="minor">
+            <a:schemeClr val="tx1"/>
+          </a:fontRef>
+        </p:style>
+      </p:cxnSp>
+      <p:cxnSp>
+        <p:nvCxnSpPr>
+          <p:cNvPr id="33" name="Straight Connector 32">
+            <a:extLst>
+              <a:ext uri="{FF2B5EF4-FFF2-40B4-BE49-F238E27FC236}">
+                <a16:creationId xmlns:a16="http://schemas.microsoft.com/office/drawing/2014/main" id="{C8B1D18F-99C1-40AB-8E63-215300E54F7D}"/>
+              </a:ext>
+            </a:extLst>
+          </p:cNvPr>
+          <p:cNvCxnSpPr/>
+          <p:nvPr/>
+        </p:nvCxnSpPr>
+        <p:spPr>
+          <a:xfrm>
+            <a:off x="26633" y="3675360"/>
+            <a:ext cx="9046346" cy="0"/>
+          </a:xfrm>
+          <a:prstGeom prst="line">
+            <a:avLst/>
+          </a:prstGeom>
+        </p:spPr>
+        <p:style>
+          <a:lnRef idx="1">
+            <a:schemeClr val="accent1"/>
+          </a:lnRef>
+          <a:fillRef idx="0">
+            <a:schemeClr val="accent1"/>
+          </a:fillRef>
+          <a:effectRef idx="0">
+            <a:schemeClr val="accent1"/>
+          </a:effectRef>
+          <a:fontRef idx="minor">
+            <a:schemeClr val="tx1"/>
+          </a:fontRef>
+        </p:style>
+      </p:cxnSp>
+      <p:cxnSp>
+        <p:nvCxnSpPr>
+          <p:cNvPr id="34" name="Straight Connector 33">
+            <a:extLst>
+              <a:ext uri="{FF2B5EF4-FFF2-40B4-BE49-F238E27FC236}">
+                <a16:creationId xmlns:a16="http://schemas.microsoft.com/office/drawing/2014/main" id="{9AB4E154-DCDE-4AC1-B9B0-5454A03D9A17}"/>
+              </a:ext>
+            </a:extLst>
+          </p:cNvPr>
+          <p:cNvCxnSpPr/>
+          <p:nvPr/>
+        </p:nvCxnSpPr>
+        <p:spPr>
+          <a:xfrm flipV="1">
+            <a:off x="2073753" y="3213717"/>
+            <a:ext cx="0" cy="3517036"/>
+          </a:xfrm>
+          <a:prstGeom prst="line">
+            <a:avLst/>
+          </a:prstGeom>
+          <a:ln>
+            <a:solidFill>
+              <a:srgbClr val="FF0000"/>
+            </a:solidFill>
+          </a:ln>
+        </p:spPr>
+        <p:style>
+          <a:lnRef idx="1">
+            <a:schemeClr val="accent1"/>
+          </a:lnRef>
+          <a:fillRef idx="0">
+            <a:schemeClr val="accent1"/>
+          </a:fillRef>
+          <a:effectRef idx="0">
+            <a:schemeClr val="accent1"/>
+          </a:effectRef>
+          <a:fontRef idx="minor">
+            <a:schemeClr val="tx1"/>
+          </a:fontRef>
+        </p:style>
+      </p:cxnSp>
+      <p:cxnSp>
+        <p:nvCxnSpPr>
+          <p:cNvPr id="35" name="Straight Connector 34">
+            <a:extLst>
+              <a:ext uri="{FF2B5EF4-FFF2-40B4-BE49-F238E27FC236}">
+                <a16:creationId xmlns:a16="http://schemas.microsoft.com/office/drawing/2014/main" id="{DB8E852A-B933-49A6-A4F8-08BC3FBCA6BE}"/>
+              </a:ext>
+            </a:extLst>
+          </p:cNvPr>
+          <p:cNvCxnSpPr/>
+          <p:nvPr/>
+        </p:nvCxnSpPr>
+        <p:spPr>
+          <a:xfrm flipV="1">
+            <a:off x="7055489" y="3277340"/>
+            <a:ext cx="0" cy="3517036"/>
+          </a:xfrm>
+          <a:prstGeom prst="line">
+            <a:avLst/>
+          </a:prstGeom>
+          <a:ln>
+            <a:solidFill>
+              <a:srgbClr val="FF0000"/>
+            </a:solidFill>
+          </a:ln>
+        </p:spPr>
+        <p:style>
+          <a:lnRef idx="1">
+            <a:schemeClr val="accent1"/>
+          </a:lnRef>
+          <a:fillRef idx="0">
+            <a:schemeClr val="accent1"/>
+          </a:fillRef>
+          <a:effectRef idx="0">
+            <a:schemeClr val="accent1"/>
+          </a:effectRef>
+          <a:fontRef idx="minor">
+            <a:schemeClr val="tx1"/>
+          </a:fontRef>
+        </p:style>
+      </p:cxnSp>
+      <p:cxnSp>
+        <p:nvCxnSpPr>
+          <p:cNvPr id="36" name="Straight Connector 35">
+            <a:extLst>
+              <a:ext uri="{FF2B5EF4-FFF2-40B4-BE49-F238E27FC236}">
+                <a16:creationId xmlns:a16="http://schemas.microsoft.com/office/drawing/2014/main" id="{E862C820-31B1-4DAA-85A8-21F66D0EF258}"/>
+              </a:ext>
+            </a:extLst>
+          </p:cNvPr>
+          <p:cNvCxnSpPr/>
+          <p:nvPr/>
+        </p:nvCxnSpPr>
+        <p:spPr>
+          <a:xfrm flipV="1">
+            <a:off x="4560092" y="3232859"/>
+            <a:ext cx="0" cy="3517036"/>
+          </a:xfrm>
+          <a:prstGeom prst="line">
+            <a:avLst/>
+          </a:prstGeom>
+          <a:ln>
+            <a:solidFill>
+              <a:srgbClr val="FF0000"/>
+            </a:solidFill>
+          </a:ln>
+        </p:spPr>
+        <p:style>
+          <a:lnRef idx="1">
+            <a:schemeClr val="accent1"/>
+          </a:lnRef>
+          <a:fillRef idx="0">
+            <a:schemeClr val="accent1"/>
+          </a:fillRef>
+          <a:effectRef idx="0">
+            <a:schemeClr val="accent1"/>
+          </a:effectRef>
+          <a:fontRef idx="minor">
+            <a:schemeClr val="tx1"/>
+          </a:fontRef>
+        </p:style>
+      </p:cxnSp>
+      <p:cxnSp>
+        <p:nvCxnSpPr>
+          <p:cNvPr id="37" name="Straight Connector 36">
+            <a:extLst>
+              <a:ext uri="{FF2B5EF4-FFF2-40B4-BE49-F238E27FC236}">
+                <a16:creationId xmlns:a16="http://schemas.microsoft.com/office/drawing/2014/main" id="{5AB1C710-346A-4577-A966-66F17A75A4FA}"/>
+              </a:ext>
+            </a:extLst>
+          </p:cNvPr>
+          <p:cNvCxnSpPr>
+            <a:cxnSpLocks/>
+          </p:cNvCxnSpPr>
+          <p:nvPr/>
+        </p:nvCxnSpPr>
+        <p:spPr>
+          <a:xfrm flipV="1">
+            <a:off x="6695005" y="3334270"/>
+            <a:ext cx="0" cy="3406099"/>
+          </a:xfrm>
+          <a:prstGeom prst="line">
+            <a:avLst/>
+          </a:prstGeom>
+          <a:ln>
+            <a:solidFill>
+              <a:schemeClr val="accent6">
+                <a:lumMod val="40000"/>
+                <a:lumOff val="60000"/>
+              </a:schemeClr>
+            </a:solidFill>
+          </a:ln>
+        </p:spPr>
+        <p:style>
+          <a:lnRef idx="1">
+            <a:schemeClr val="accent1"/>
+          </a:lnRef>
+          <a:fillRef idx="0">
+            <a:schemeClr val="accent1"/>
+          </a:fillRef>
+          <a:effectRef idx="0">
+            <a:schemeClr val="accent1"/>
+          </a:effectRef>
+          <a:fontRef idx="minor">
+            <a:schemeClr val="tx1"/>
+          </a:fontRef>
+        </p:style>
+      </p:cxnSp>
+      <p:cxnSp>
+        <p:nvCxnSpPr>
+          <p:cNvPr id="38" name="Straight Connector 37">
+            <a:extLst>
+              <a:ext uri="{FF2B5EF4-FFF2-40B4-BE49-F238E27FC236}">
+                <a16:creationId xmlns:a16="http://schemas.microsoft.com/office/drawing/2014/main" id="{119B172F-C03D-409E-9033-E2C634D1CDCF}"/>
+              </a:ext>
+            </a:extLst>
+          </p:cNvPr>
+          <p:cNvCxnSpPr>
+            <a:cxnSpLocks/>
+          </p:cNvCxnSpPr>
+          <p:nvPr/>
+        </p:nvCxnSpPr>
+        <p:spPr>
+          <a:xfrm flipV="1">
+            <a:off x="2426629" y="3343796"/>
+            <a:ext cx="0" cy="3406099"/>
+          </a:xfrm>
+          <a:prstGeom prst="line">
+            <a:avLst/>
+          </a:prstGeom>
+          <a:ln>
+            <a:solidFill>
+              <a:schemeClr val="accent6">
+                <a:lumMod val="40000"/>
+                <a:lumOff val="60000"/>
+              </a:schemeClr>
+            </a:solidFill>
+          </a:ln>
+        </p:spPr>
+        <p:style>
+          <a:lnRef idx="1">
+            <a:schemeClr val="accent1"/>
+          </a:lnRef>
+          <a:fillRef idx="0">
+            <a:schemeClr val="accent1"/>
+          </a:fillRef>
+          <a:effectRef idx="0">
+            <a:schemeClr val="accent1"/>
+          </a:effectRef>
+          <a:fontRef idx="minor">
+            <a:schemeClr val="tx1"/>
+          </a:fontRef>
+        </p:style>
+      </p:cxnSp>
+      <p:sp>
+        <p:nvSpPr>
+          <p:cNvPr id="39" name="TextBox 38">
+            <a:extLst>
+              <a:ext uri="{FF2B5EF4-FFF2-40B4-BE49-F238E27FC236}">
+                <a16:creationId xmlns:a16="http://schemas.microsoft.com/office/drawing/2014/main" id="{9AD56F64-2A09-462B-864D-B24061B0A54E}"/>
+              </a:ext>
+            </a:extLst>
+          </p:cNvPr>
+          <p:cNvSpPr txBox="1"/>
+          <p:nvPr/>
+        </p:nvSpPr>
+        <p:spPr>
+          <a:xfrm>
+            <a:off x="372862" y="310718"/>
+            <a:ext cx="2853153" cy="369332"/>
+          </a:xfrm>
+          <a:prstGeom prst="rect">
+            <a:avLst/>
+          </a:prstGeom>
+          <a:noFill/>
+        </p:spPr>
+        <p:txBody>
+          <a:bodyPr wrap="none" rtlCol="0">
+            <a:spAutoFit/>
+          </a:bodyPr>
+          <a:lstStyle/>
+          <a:p>
+            <a:r>
+              <a:rPr lang="en-US" dirty="0" err="1"/>
+              <a:t>DefaultFor</a:t>
+            </a:r>
+            <a:r>
+              <a:rPr lang="en-US" dirty="0"/>
+              <a:t>=</a:t>
+            </a:r>
+            <a:r>
+              <a:rPr lang="en-US" dirty="0" err="1"/>
+              <a:t>Formation_Lines</a:t>
+            </a:r>
+            <a:endParaRPr lang="en-US" dirty="0"/>
+          </a:p>
+        </p:txBody>
+      </p:sp>
+      <p:sp>
+        <p:nvSpPr>
+          <p:cNvPr id="46" name="TextBox 45">
+            <a:extLst>
+              <a:ext uri="{FF2B5EF4-FFF2-40B4-BE49-F238E27FC236}">
+                <a16:creationId xmlns:a16="http://schemas.microsoft.com/office/drawing/2014/main" id="{1860016D-777D-426F-9C82-4F0AF7A15085}"/>
+              </a:ext>
+            </a:extLst>
+          </p:cNvPr>
+          <p:cNvSpPr txBox="1"/>
+          <p:nvPr/>
+        </p:nvSpPr>
+        <p:spPr>
+          <a:xfrm>
+            <a:off x="385641" y="0"/>
+            <a:ext cx="2292166" cy="369332"/>
+          </a:xfrm>
+          <a:prstGeom prst="rect">
+            <a:avLst/>
+          </a:prstGeom>
+          <a:noFill/>
+        </p:spPr>
+        <p:txBody>
+          <a:bodyPr wrap="none" rtlCol="0">
+            <a:spAutoFit/>
+          </a:bodyPr>
+          <a:lstStyle/>
+          <a:p>
+            <a:r>
+              <a:rPr lang="en-US" dirty="0" err="1"/>
+              <a:t>TemplateType</a:t>
+            </a:r>
+            <a:r>
+              <a:rPr lang="en-US" dirty="0"/>
+              <a:t>=Default</a:t>
+            </a:r>
+          </a:p>
+        </p:txBody>
+      </p:sp>
+    </p:spTree>
+    <p:extLst>
+      <p:ext uri="{BB962C8B-B14F-4D97-AF65-F5344CB8AC3E}">
+        <p14:creationId xmlns:p14="http://schemas.microsoft.com/office/powerpoint/2010/main" val="132713738"/>
+      </p:ext>
+    </p:extLst>
+  </p:cSld>
+  <p:clrMapOvr>
+    <a:masterClrMapping/>
+  </p:clrMapOvr>
+</p:sld>
+</file>
+
+<file path=ppt/slides/slide7.xml><?xml version="1.0" encoding="utf-8"?>
+<p:sld xmlns:a="http://schemas.openxmlformats.org/drawingml/2006/main" xmlns:r="http://schemas.openxmlformats.org/officeDocument/2006/relationships" xmlns:p="http://schemas.openxmlformats.org/presentationml/2006/main">
+  <p:cSld>
+    <p:spTree>
+      <p:nvGrpSpPr>
+        <p:cNvPr id="1" name=""/>
+        <p:cNvGrpSpPr/>
+        <p:nvPr/>
+      </p:nvGrpSpPr>
+      <p:grpSpPr>
+        <a:xfrm>
+          <a:off x="0" y="0"/>
+          <a:ext cx="0" cy="0"/>
+          <a:chOff x="0" y="0"/>
+          <a:chExt cx="0" cy="0"/>
+        </a:xfrm>
+      </p:grpSpPr>
+      <p:cxnSp>
+        <p:nvCxnSpPr>
+          <p:cNvPr id="18" name="Straight Connector 17">
+            <a:extLst>
+              <a:ext uri="{FF2B5EF4-FFF2-40B4-BE49-F238E27FC236}">
+                <a16:creationId xmlns:a16="http://schemas.microsoft.com/office/drawing/2014/main" id="{15EC7B01-C95D-446B-86CF-863B18F5AB5B}"/>
+              </a:ext>
+            </a:extLst>
+          </p:cNvPr>
+          <p:cNvCxnSpPr>
+            <a:cxnSpLocks/>
+          </p:cNvCxnSpPr>
+          <p:nvPr/>
+        </p:nvCxnSpPr>
+        <p:spPr>
+          <a:xfrm flipH="1">
+            <a:off x="159595" y="5687608"/>
+            <a:ext cx="8637972" cy="0"/>
+          </a:xfrm>
+          <a:prstGeom prst="line">
+            <a:avLst/>
+          </a:prstGeom>
+        </p:spPr>
+        <p:style>
+          <a:lnRef idx="1">
+            <a:schemeClr val="accent1"/>
+          </a:lnRef>
+          <a:fillRef idx="0">
+            <a:schemeClr val="accent1"/>
+          </a:fillRef>
+          <a:effectRef idx="0">
+            <a:schemeClr val="accent1"/>
+          </a:effectRef>
+          <a:fontRef idx="minor">
+            <a:schemeClr val="tx1"/>
+          </a:fontRef>
+        </p:style>
+      </p:cxnSp>
+      <p:cxnSp>
+        <p:nvCxnSpPr>
+          <p:cNvPr id="19" name="Straight Connector 18">
+            <a:extLst>
+              <a:ext uri="{FF2B5EF4-FFF2-40B4-BE49-F238E27FC236}">
+                <a16:creationId xmlns:a16="http://schemas.microsoft.com/office/drawing/2014/main" id="{F8C63B8D-C02E-4A4B-8021-FDB1E74ACD33}"/>
+              </a:ext>
+            </a:extLst>
+          </p:cNvPr>
+          <p:cNvCxnSpPr/>
+          <p:nvPr/>
+        </p:nvCxnSpPr>
+        <p:spPr>
+          <a:xfrm flipV="1">
+            <a:off x="4560092" y="3232859"/>
+            <a:ext cx="0" cy="3517036"/>
+          </a:xfrm>
+          <a:prstGeom prst="line">
+            <a:avLst/>
+          </a:prstGeom>
+          <a:ln>
+            <a:solidFill>
+              <a:srgbClr val="FF0000"/>
+            </a:solidFill>
+          </a:ln>
+        </p:spPr>
+        <p:style>
+          <a:lnRef idx="1">
+            <a:schemeClr val="accent1"/>
+          </a:lnRef>
+          <a:fillRef idx="0">
+            <a:schemeClr val="accent1"/>
+          </a:fillRef>
+          <a:effectRef idx="0">
+            <a:schemeClr val="accent1"/>
+          </a:effectRef>
+          <a:fontRef idx="minor">
+            <a:schemeClr val="tx1"/>
+          </a:fontRef>
+        </p:style>
+      </p:cxnSp>
+      <p:cxnSp>
+        <p:nvCxnSpPr>
+          <p:cNvPr id="20" name="Straight Connector 19">
+            <a:extLst>
+              <a:ext uri="{FF2B5EF4-FFF2-40B4-BE49-F238E27FC236}">
+                <a16:creationId xmlns:a16="http://schemas.microsoft.com/office/drawing/2014/main" id="{80EB5DBF-9C15-40E6-9C65-ABE5FDFD472A}"/>
+              </a:ext>
+            </a:extLst>
+          </p:cNvPr>
+          <p:cNvCxnSpPr>
+            <a:cxnSpLocks/>
+          </p:cNvCxnSpPr>
+          <p:nvPr/>
+        </p:nvCxnSpPr>
+        <p:spPr>
+          <a:xfrm flipH="1">
+            <a:off x="159595" y="6132832"/>
+            <a:ext cx="8637972" cy="0"/>
+          </a:xfrm>
+          <a:prstGeom prst="line">
+            <a:avLst/>
+          </a:prstGeom>
+        </p:spPr>
+        <p:style>
+          <a:lnRef idx="1">
+            <a:schemeClr val="accent1"/>
+          </a:lnRef>
+          <a:fillRef idx="0">
+            <a:schemeClr val="accent1"/>
+          </a:fillRef>
+          <a:effectRef idx="0">
+            <a:schemeClr val="accent1"/>
+          </a:effectRef>
+          <a:fontRef idx="minor">
+            <a:schemeClr val="tx1"/>
+          </a:fontRef>
+        </p:style>
+      </p:cxnSp>
+      <p:cxnSp>
+        <p:nvCxnSpPr>
+          <p:cNvPr id="21" name="Straight Connector 20">
+            <a:extLst>
+              <a:ext uri="{FF2B5EF4-FFF2-40B4-BE49-F238E27FC236}">
+                <a16:creationId xmlns:a16="http://schemas.microsoft.com/office/drawing/2014/main" id="{50C5EE44-85F4-44D0-9DFA-7AE59239EAD0}"/>
+              </a:ext>
+            </a:extLst>
+          </p:cNvPr>
+          <p:cNvCxnSpPr>
+            <a:cxnSpLocks/>
+          </p:cNvCxnSpPr>
+          <p:nvPr/>
+        </p:nvCxnSpPr>
+        <p:spPr>
+          <a:xfrm>
+            <a:off x="5088730" y="4743450"/>
+            <a:ext cx="0" cy="2000821"/>
+          </a:xfrm>
+          <a:prstGeom prst="line">
+            <a:avLst/>
+          </a:prstGeom>
+        </p:spPr>
+        <p:style>
+          <a:lnRef idx="1">
+            <a:schemeClr val="accent1"/>
+          </a:lnRef>
+          <a:fillRef idx="0">
+            <a:schemeClr val="accent1"/>
+          </a:fillRef>
+          <a:effectRef idx="0">
+            <a:schemeClr val="accent1"/>
+          </a:effectRef>
+          <a:fontRef idx="minor">
+            <a:schemeClr val="tx1"/>
+          </a:fontRef>
+        </p:style>
+      </p:cxnSp>
+      <p:cxnSp>
+        <p:nvCxnSpPr>
+          <p:cNvPr id="22" name="Straight Connector 21">
+            <a:extLst>
+              <a:ext uri="{FF2B5EF4-FFF2-40B4-BE49-F238E27FC236}">
+                <a16:creationId xmlns:a16="http://schemas.microsoft.com/office/drawing/2014/main" id="{8FFEA17C-50FF-4426-AE85-F2527EDEBC89}"/>
+              </a:ext>
+            </a:extLst>
+          </p:cNvPr>
+          <p:cNvCxnSpPr>
+            <a:cxnSpLocks/>
+          </p:cNvCxnSpPr>
+          <p:nvPr/>
+        </p:nvCxnSpPr>
+        <p:spPr>
+          <a:xfrm>
+            <a:off x="4034630" y="4742784"/>
+            <a:ext cx="0" cy="2000821"/>
+          </a:xfrm>
+          <a:prstGeom prst="line">
+            <a:avLst/>
+          </a:prstGeom>
+        </p:spPr>
+        <p:style>
+          <a:lnRef idx="1">
+            <a:schemeClr val="accent1"/>
+          </a:lnRef>
+          <a:fillRef idx="0">
+            <a:schemeClr val="accent1"/>
+          </a:fillRef>
+          <a:effectRef idx="0">
+            <a:schemeClr val="accent1"/>
+          </a:effectRef>
+          <a:fontRef idx="minor">
+            <a:schemeClr val="tx1"/>
+          </a:fontRef>
+        </p:style>
+      </p:cxnSp>
+      <p:cxnSp>
+        <p:nvCxnSpPr>
+          <p:cNvPr id="34" name="Straight Connector 33">
+            <a:extLst>
+              <a:ext uri="{FF2B5EF4-FFF2-40B4-BE49-F238E27FC236}">
+                <a16:creationId xmlns:a16="http://schemas.microsoft.com/office/drawing/2014/main" id="{A4971B96-589B-4B65-A9F4-86E72142DC00}"/>
+              </a:ext>
+            </a:extLst>
+          </p:cNvPr>
+          <p:cNvCxnSpPr>
+            <a:cxnSpLocks/>
+          </p:cNvCxnSpPr>
+          <p:nvPr/>
+        </p:nvCxnSpPr>
+        <p:spPr>
+          <a:xfrm flipH="1">
+            <a:off x="159595" y="6744271"/>
+            <a:ext cx="8637972" cy="0"/>
+          </a:xfrm>
+          <a:prstGeom prst="line">
+            <a:avLst/>
+          </a:prstGeom>
+        </p:spPr>
+        <p:style>
+          <a:lnRef idx="1">
+            <a:schemeClr val="accent1"/>
+          </a:lnRef>
+          <a:fillRef idx="0">
+            <a:schemeClr val="accent1"/>
+          </a:fillRef>
+          <a:effectRef idx="0">
+            <a:schemeClr val="accent1"/>
+          </a:effectRef>
+          <a:fontRef idx="minor">
+            <a:schemeClr val="tx1"/>
+          </a:fontRef>
+        </p:style>
+      </p:cxnSp>
+      <p:sp>
+        <p:nvSpPr>
+          <p:cNvPr id="26" name="TextBox 25">
+            <a:extLst>
+              <a:ext uri="{FF2B5EF4-FFF2-40B4-BE49-F238E27FC236}">
+                <a16:creationId xmlns:a16="http://schemas.microsoft.com/office/drawing/2014/main" id="{8A8F4799-27F1-41D6-B3B8-0827BDE3EC72}"/>
+              </a:ext>
+            </a:extLst>
+          </p:cNvPr>
+          <p:cNvSpPr txBox="1"/>
+          <p:nvPr/>
+        </p:nvSpPr>
+        <p:spPr>
+          <a:xfrm>
+            <a:off x="372862" y="310718"/>
+            <a:ext cx="2733377" cy="369332"/>
+          </a:xfrm>
+          <a:prstGeom prst="rect">
+            <a:avLst/>
+          </a:prstGeom>
+          <a:noFill/>
+        </p:spPr>
+        <p:txBody>
+          <a:bodyPr wrap="none" rtlCol="0">
+            <a:spAutoFit/>
+          </a:bodyPr>
+          <a:lstStyle/>
+          <a:p>
+            <a:r>
+              <a:rPr lang="en-US" dirty="0" err="1"/>
+              <a:t>DefaultFor</a:t>
+            </a:r>
+            <a:r>
+              <a:rPr lang="en-US" dirty="0"/>
+              <a:t>=</a:t>
+            </a:r>
+            <a:r>
+              <a:rPr lang="en-US" dirty="0" err="1"/>
+              <a:t>Backfield_Lines</a:t>
+            </a:r>
+            <a:endParaRPr lang="en-US" dirty="0"/>
+          </a:p>
+        </p:txBody>
+      </p:sp>
+      <p:sp>
+        <p:nvSpPr>
+          <p:cNvPr id="27" name="TextBox 26">
+            <a:extLst>
+              <a:ext uri="{FF2B5EF4-FFF2-40B4-BE49-F238E27FC236}">
+                <a16:creationId xmlns:a16="http://schemas.microsoft.com/office/drawing/2014/main" id="{7E81A3E1-7E69-41E7-B831-7D403BECCAEE}"/>
+              </a:ext>
+            </a:extLst>
+          </p:cNvPr>
+          <p:cNvSpPr txBox="1"/>
+          <p:nvPr/>
+        </p:nvSpPr>
+        <p:spPr>
+          <a:xfrm>
+            <a:off x="385641" y="0"/>
+            <a:ext cx="2292166" cy="369332"/>
+          </a:xfrm>
+          <a:prstGeom prst="rect">
+            <a:avLst/>
+          </a:prstGeom>
+          <a:noFill/>
+        </p:spPr>
+        <p:txBody>
+          <a:bodyPr wrap="none" rtlCol="0">
+            <a:spAutoFit/>
+          </a:bodyPr>
+          <a:lstStyle/>
+          <a:p>
+            <a:r>
+              <a:rPr lang="en-US" dirty="0" err="1"/>
+              <a:t>TemplateType</a:t>
+            </a:r>
+            <a:r>
+              <a:rPr lang="en-US" dirty="0"/>
+              <a:t>=Default</a:t>
+            </a:r>
+          </a:p>
+        </p:txBody>
+      </p:sp>
+    </p:spTree>
+    <p:extLst>
+      <p:ext uri="{BB962C8B-B14F-4D97-AF65-F5344CB8AC3E}">
+        <p14:creationId xmlns:p14="http://schemas.microsoft.com/office/powerpoint/2010/main" val="2404981145"/>
+      </p:ext>
+    </p:extLst>
+  </p:cSld>
+  <p:clrMapOvr>
+    <a:masterClrMapping/>
+  </p:clrMapOvr>
+</p:sld>
+</file>
+
 <file path=ppt/theme/theme1.xml><?xml version="1.0" encoding="utf-8"?>
 <a:theme xmlns:a="http://schemas.openxmlformats.org/drawingml/2006/main" name="Office Theme">
   <a:themeElements>

</xml_diff>